<commit_message>
graph legent font increase
</commit_message>
<xml_diff>
--- a/serversideframeworks.pptx
+++ b/serversideframeworks.pptx
@@ -124,7 +124,7 @@
   </p:defaultTextStyle>
   <p:extLst>
     <p:ext uri="{EFAFB233-063F-42B5-8137-9DF3F51BA10A}">
-      <p15:sldGuideLst xmlns="" xmlns:p15="http://schemas.microsoft.com/office/powerpoint/2012/main">
+      <p15:sldGuideLst xmlns:p15="http://schemas.microsoft.com/office/powerpoint/2012/main" xmlns="">
         <p15:guide id="1" orient="horz" pos="2160">
           <p15:clr>
             <a:srgbClr val="A4A3A4"/>
@@ -168,7 +168,25 @@
               <a:rPr lang="en-US" sz="1800" b="1" i="0" baseline="0" dirty="0" smtClean="0">
                 <a:effectLst/>
               </a:rPr>
-              <a:t>Server Side Frameworks Popularity Across Websites</a:t>
+              <a:t>Server </a:t>
+            </a:r>
+            <a:r>
+              <a:rPr lang="en-US" sz="1800" b="1" i="0" baseline="0" smtClean="0">
+                <a:effectLst/>
+              </a:rPr>
+              <a:t>Side </a:t>
+            </a:r>
+            <a:r>
+              <a:rPr lang="en-US" sz="1800" b="1" i="0" baseline="0" smtClean="0">
+                <a:effectLst/>
+              </a:rPr>
+              <a:t>Frameworks Popularity </a:t>
+            </a:r>
+            <a:r>
+              <a:rPr lang="en-US" sz="1800" b="1" i="0" baseline="0" dirty="0" smtClean="0">
+                <a:effectLst/>
+              </a:rPr>
+              <a:t>Across Websites</a:t>
             </a:r>
             <a:endParaRPr lang="en-US" dirty="0">
               <a:effectLst/>
@@ -441,11 +459,11 @@
         </c:dLbls>
         <c:gapWidth val="150"/>
         <c:overlap val="-25"/>
-        <c:axId val="176751360"/>
-        <c:axId val="176752896"/>
+        <c:axId val="177277568"/>
+        <c:axId val="177291648"/>
       </c:barChart>
       <c:catAx>
-        <c:axId val="176751360"/>
+        <c:axId val="177277568"/>
         <c:scaling>
           <c:orientation val="minMax"/>
         </c:scaling>
@@ -455,7 +473,7 @@
         <c:majorTickMark val="none"/>
         <c:minorTickMark val="none"/>
         <c:tickLblPos val="nextTo"/>
-        <c:crossAx val="176752896"/>
+        <c:crossAx val="177291648"/>
         <c:crosses val="autoZero"/>
         <c:auto val="1"/>
         <c:lblAlgn val="ctr"/>
@@ -463,7 +481,7 @@
         <c:noMultiLvlLbl val="0"/>
       </c:catAx>
       <c:valAx>
-        <c:axId val="176752896"/>
+        <c:axId val="177291648"/>
         <c:scaling>
           <c:orientation val="minMax"/>
           <c:max val="200000"/>
@@ -474,7 +492,7 @@
         <c:majorTickMark val="none"/>
         <c:minorTickMark val="none"/>
         <c:tickLblPos val="nextTo"/>
-        <c:crossAx val="176751360"/>
+        <c:crossAx val="177277568"/>
         <c:crosses val="autoZero"/>
         <c:crossBetween val="between"/>
       </c:valAx>
@@ -485,13 +503,23 @@
         <c:manualLayout>
           <c:xMode val="edge"/>
           <c:yMode val="edge"/>
-          <c:x val="0.37288495188101489"/>
+          <c:x val="0.21467239149454145"/>
           <c:y val="2.619493130618674E-2"/>
-          <c:w val="0.25423000114116168"/>
-          <c:h val="5.2777559454126523E-2"/>
+          <c:w val="0.65640391418463995"/>
+          <c:h val="0.14033683432544197"/>
         </c:manualLayout>
       </c:layout>
       <c:overlay val="0"/>
+      <c:txPr>
+        <a:bodyPr/>
+        <a:lstStyle/>
+        <a:p>
+          <a:pPr>
+            <a:defRPr sz="2000"/>
+          </a:pPr>
+          <a:endParaRPr lang="en-US"/>
+        </a:p>
+      </c:txPr>
     </c:legend>
     <c:plotVisOnly val="1"/>
     <c:dispBlanksAs val="gap"/>
@@ -531,7 +559,19 @@
               <a:rPr lang="en-US" sz="1800" b="1" i="0" baseline="0" dirty="0" smtClean="0">
                 <a:effectLst/>
               </a:rPr>
-              <a:t>Client Side Frameworks Popularity Across Websites</a:t>
+              <a:t>Client Side </a:t>
+            </a:r>
+            <a:r>
+              <a:rPr lang="en-US" sz="1800" b="1" i="0" baseline="0" dirty="0" smtClean="0">
+                <a:effectLst/>
+              </a:rPr>
+              <a:t>Frameworks </a:t>
+            </a:r>
+            <a:r>
+              <a:rPr lang="en-US" sz="1800" b="1" i="0" baseline="0" dirty="0" smtClean="0">
+                <a:effectLst/>
+              </a:rPr>
+              <a:t>Popularity Across Websites</a:t>
             </a:r>
             <a:endParaRPr lang="en-US" dirty="0">
               <a:effectLst/>
@@ -747,11 +787,11 @@
         </c:dLbls>
         <c:gapWidth val="150"/>
         <c:overlap val="-25"/>
-        <c:axId val="176788224"/>
-        <c:axId val="176789760"/>
+        <c:axId val="177357568"/>
+        <c:axId val="177359104"/>
       </c:barChart>
       <c:catAx>
-        <c:axId val="176788224"/>
+        <c:axId val="177357568"/>
         <c:scaling>
           <c:orientation val="minMax"/>
         </c:scaling>
@@ -761,7 +801,7 @@
         <c:majorTickMark val="none"/>
         <c:minorTickMark val="none"/>
         <c:tickLblPos val="nextTo"/>
-        <c:crossAx val="176789760"/>
+        <c:crossAx val="177359104"/>
         <c:crosses val="autoZero"/>
         <c:auto val="1"/>
         <c:lblAlgn val="ctr"/>
@@ -769,7 +809,7 @@
         <c:noMultiLvlLbl val="0"/>
       </c:catAx>
       <c:valAx>
-        <c:axId val="176789760"/>
+        <c:axId val="177359104"/>
         <c:scaling>
           <c:orientation val="minMax"/>
         </c:scaling>
@@ -779,7 +819,7 @@
         <c:majorTickMark val="none"/>
         <c:minorTickMark val="none"/>
         <c:tickLblPos val="nextTo"/>
-        <c:crossAx val="176788224"/>
+        <c:crossAx val="177357568"/>
         <c:crosses val="autoZero"/>
         <c:crossBetween val="between"/>
       </c:valAx>
@@ -790,13 +830,23 @@
         <c:manualLayout>
           <c:xMode val="edge"/>
           <c:yMode val="edge"/>
-          <c:x val="0.38420423835909401"/>
+          <c:x val="0.26666666666666666"/>
           <c:y val="2.3038238872235328E-2"/>
-          <c:w val="0.23159142607174102"/>
-          <c:h val="4.6417454109169434E-2"/>
+          <c:w val="0.39578895693593852"/>
+          <c:h val="0.22610209442761348"/>
         </c:manualLayout>
       </c:layout>
       <c:overlay val="0"/>
+      <c:txPr>
+        <a:bodyPr/>
+        <a:lstStyle/>
+        <a:p>
+          <a:pPr>
+            <a:defRPr sz="1800"/>
+          </a:pPr>
+          <a:endParaRPr lang="en-US"/>
+        </a:p>
+      </c:txPr>
     </c:legend>
     <c:plotVisOnly val="1"/>
     <c:dispBlanksAs val="gap"/>
@@ -6709,7 +6759,7 @@
             <p:ph idx="1"/>
             <p:extLst>
               <p:ext uri="{D42A27DB-BD31-4B8C-83A1-F6EECF244321}">
-                <p14:modId xmlns:p14="http://schemas.microsoft.com/office/powerpoint/2010/main" val="1108031158"/>
+                <p14:modId xmlns:p14="http://schemas.microsoft.com/office/powerpoint/2010/main" val="3075862068"/>
               </p:ext>
             </p:extLst>
           </p:nvPr>
@@ -6892,7 +6942,7 @@
           <p:nvPr>
             <p:extLst>
               <p:ext uri="{D42A27DB-BD31-4B8C-83A1-F6EECF244321}">
-                <p14:modId xmlns:p14="http://schemas.microsoft.com/office/powerpoint/2010/main" val="2347526280"/>
+                <p14:modId xmlns:p14="http://schemas.microsoft.com/office/powerpoint/2010/main" val="3221788123"/>
               </p:ext>
             </p:extLst>
           </p:nvPr>
@@ -8978,7 +9028,7 @@
   <a:extraClrSchemeLst/>
   <a:extLst>
     <a:ext uri="{05A4C25C-085E-4340-85A3-A5531E510DB2}">
-      <thm15:themeFamily xmlns="" xmlns:thm15="http://schemas.microsoft.com/office/thememl/2012/main" name="Office Theme" id="{62F939B6-93AF-4DB8-9C6B-D6C7DFDC589F}" vid="{4A3C46E8-61CC-4603-A589-7422A47A8E4A}"/>
+      <thm15:themeFamily xmlns:thm15="http://schemas.microsoft.com/office/thememl/2012/main" xmlns="" name="Office Theme" id="{62F939B6-93AF-4DB8-9C6B-D6C7DFDC589F}" vid="{4A3C46E8-61CC-4603-A589-7422A47A8E4A}"/>
     </a:ext>
   </a:extLst>
 </a:theme>
@@ -9239,7 +9289,7 @@
   <a:extraClrSchemeLst/>
   <a:extLst>
     <a:ext uri="{05A4C25C-085E-4340-85A3-A5531E510DB2}">
-      <thm15:themeFamily xmlns="" xmlns:thm15="http://schemas.microsoft.com/office/thememl/2012/main" name="Office Theme" id="{62F939B6-93AF-4DB8-9C6B-D6C7DFDC589F}" vid="{4A3C46E8-61CC-4603-A589-7422A47A8E4A}"/>
+      <thm15:themeFamily xmlns:thm15="http://schemas.microsoft.com/office/thememl/2012/main" xmlns="" name="Office Theme" id="{62F939B6-93AF-4DB8-9C6B-D6C7DFDC589F}" vid="{4A3C46E8-61CC-4603-A589-7422A47A8E4A}"/>
     </a:ext>
   </a:extLst>
 </a:theme>

</xml_diff>